<commit_message>
Added axis labels and title, changed the slides
</commit_message>
<xml_diff>
--- a/Lab2/LLM_Homework_1_3.pptx
+++ b/Lab2/LLM_Homework_1_3.pptx
@@ -109,6 +109,11 @@
       </a:defRPr>
     </a:lvl9pPr>
   </p:defaultTextStyle>
+  <p:extLst>
+    <p:ext uri="{EFAFB233-063F-42B5-8137-9DF3F51BA10A}">
+      <p15:sldGuideLst xmlns:p15="http://schemas.microsoft.com/office/powerpoint/2012/main"/>
+    </p:ext>
+  </p:extLst>
 </p:presentation>
 </file>
 
@@ -3458,6 +3463,47 @@
           </a:p>
         </p:txBody>
       </p:sp>
+      <p:sp>
+        <p:nvSpPr>
+          <p:cNvPr id="2" name="TextBox 1">
+            <a:extLst>
+              <a:ext uri="{FF2B5EF4-FFF2-40B4-BE49-F238E27FC236}">
+                <a16:creationId xmlns:a16="http://schemas.microsoft.com/office/drawing/2014/main" id="{B3268592-551F-BDE2-FAC4-D0E3BF48CB8B}"/>
+              </a:ext>
+            </a:extLst>
+          </p:cNvPr>
+          <p:cNvSpPr txBox="1"/>
+          <p:nvPr/>
+        </p:nvSpPr>
+        <p:spPr>
+          <a:xfrm>
+            <a:off x="4333017" y="506994"/>
+            <a:ext cx="3525965" cy="369332"/>
+          </a:xfrm>
+          <a:prstGeom prst="rect">
+            <a:avLst/>
+          </a:prstGeom>
+          <a:noFill/>
+        </p:spPr>
+        <p:txBody>
+          <a:bodyPr wrap="none" rtlCol="0">
+            <a:spAutoFit/>
+          </a:bodyPr>
+          <a:lstStyle/>
+          <a:p>
+            <a:r>
+              <a:rPr lang="en-US" sz="1800" b="0" i="0" u="none" strike="noStrike" dirty="0">
+                <a:solidFill>
+                  <a:srgbClr val="000000"/>
+                </a:solidFill>
+                <a:effectLst/>
+                <a:latin typeface="Calibri" panose="020F0502020204030204" pitchFamily="34" charset="0"/>
+              </a:rPr>
+              <a:t>1. Ask the LLM to review your code.</a:t>
+            </a:r>
+          </a:p>
+        </p:txBody>
+      </p:sp>
     </p:spTree>
     <p:extLst>
       <p:ext uri="{BB962C8B-B14F-4D97-AF65-F5344CB8AC3E}">
@@ -3488,31 +3534,6 @@
           <a:chExt cx="0" cy="0"/>
         </a:xfrm>
       </p:grpSpPr>
-      <p:sp>
-        <p:nvSpPr>
-          <p:cNvPr id="2" name="Pavadinimas 1">
-            <a:extLst>
-              <a:ext uri="{FF2B5EF4-FFF2-40B4-BE49-F238E27FC236}">
-                <a16:creationId xmlns:a16="http://schemas.microsoft.com/office/drawing/2014/main" id="{ED406115-13AA-2C27-304C-D11A0F79C205}"/>
-              </a:ext>
-            </a:extLst>
-          </p:cNvPr>
-          <p:cNvSpPr>
-            <a:spLocks noGrp="1"/>
-          </p:cNvSpPr>
-          <p:nvPr>
-            <p:ph type="title"/>
-          </p:nvPr>
-        </p:nvSpPr>
-        <p:spPr/>
-        <p:txBody>
-          <a:bodyPr/>
-          <a:lstStyle/>
-          <a:p>
-            <a:endParaRPr lang="lt-LT" dirty="0"/>
-          </a:p>
-        </p:txBody>
-      </p:sp>
       <p:pic>
         <p:nvPicPr>
           <p:cNvPr id="5" name="Turinio vietos rezervavimo ženklas 4">
@@ -3542,6 +3563,48 @@
           </a:xfrm>
         </p:spPr>
       </p:pic>
+      <p:sp>
+        <p:nvSpPr>
+          <p:cNvPr id="3" name="TextBox 2">
+            <a:extLst>
+              <a:ext uri="{FF2B5EF4-FFF2-40B4-BE49-F238E27FC236}">
+                <a16:creationId xmlns:a16="http://schemas.microsoft.com/office/drawing/2014/main" id="{1F428E09-27E2-2641-5C8D-B43478AE65F8}"/>
+              </a:ext>
+            </a:extLst>
+          </p:cNvPr>
+          <p:cNvSpPr txBox="1"/>
+          <p:nvPr/>
+        </p:nvSpPr>
+        <p:spPr>
+          <a:xfrm>
+            <a:off x="4311247" y="506994"/>
+            <a:ext cx="3569503" cy="369332"/>
+          </a:xfrm>
+          <a:prstGeom prst="rect">
+            <a:avLst/>
+          </a:prstGeom>
+          <a:noFill/>
+        </p:spPr>
+        <p:txBody>
+          <a:bodyPr wrap="none" rtlCol="0">
+            <a:spAutoFit/>
+          </a:bodyPr>
+          <a:lstStyle/>
+          <a:p>
+            <a:pPr algn="l"/>
+            <a:r>
+              <a:rPr lang="en-US" sz="1800" b="0" i="0" u="none" strike="noStrike" dirty="0">
+                <a:solidFill>
+                  <a:srgbClr val="000000"/>
+                </a:solidFill>
+                <a:effectLst/>
+                <a:latin typeface="Calibri" panose="020F0502020204030204" pitchFamily="34" charset="0"/>
+              </a:rPr>
+              <a:t>2. Ask the LLM to explain your code.</a:t>
+            </a:r>
+          </a:p>
+        </p:txBody>
+      </p:sp>
     </p:spTree>
     <p:extLst>
       <p:ext uri="{BB962C8B-B14F-4D97-AF65-F5344CB8AC3E}">
@@ -3594,7 +3657,7 @@
         </p:blipFill>
         <p:spPr>
           <a:xfrm>
-            <a:off x="1405669" y="4162427"/>
+            <a:off x="1405671" y="5094934"/>
             <a:ext cx="9380655" cy="1033462"/>
           </a:xfrm>
           <a:prstGeom prst="rect">
@@ -3624,7 +3687,7 @@
         </p:blipFill>
         <p:spPr>
           <a:xfrm>
-            <a:off x="4442088" y="1428749"/>
+            <a:off x="4442090" y="2361256"/>
             <a:ext cx="3307821" cy="1266825"/>
           </a:xfrm>
           <a:prstGeom prst="rect">
@@ -3646,7 +3709,7 @@
         </p:nvSpPr>
         <p:spPr>
           <a:xfrm>
-            <a:off x="5280262" y="555694"/>
+            <a:off x="5280264" y="1488201"/>
             <a:ext cx="1631472" cy="707886"/>
           </a:xfrm>
           <a:prstGeom prst="rect">
@@ -3682,7 +3745,7 @@
         </p:nvSpPr>
         <p:spPr>
           <a:xfrm>
-            <a:off x="5471211" y="3314700"/>
+            <a:off x="5471213" y="4247207"/>
             <a:ext cx="1249573" cy="707886"/>
           </a:xfrm>
           <a:prstGeom prst="rect">
@@ -3701,6 +3764,48 @@
               <a:t>After</a:t>
             </a:r>
             <a:endParaRPr lang="lt-LT" sz="4000" dirty="0"/>
+          </a:p>
+        </p:txBody>
+      </p:sp>
+      <p:sp>
+        <p:nvSpPr>
+          <p:cNvPr id="2" name="TextBox 1">
+            <a:extLst>
+              <a:ext uri="{FF2B5EF4-FFF2-40B4-BE49-F238E27FC236}">
+                <a16:creationId xmlns:a16="http://schemas.microsoft.com/office/drawing/2014/main" id="{57D73A0D-E0F6-DDD7-6B2D-1EC20D288FAF}"/>
+              </a:ext>
+            </a:extLst>
+          </p:cNvPr>
+          <p:cNvSpPr txBox="1"/>
+          <p:nvPr/>
+        </p:nvSpPr>
+        <p:spPr>
+          <a:xfrm>
+            <a:off x="3795691" y="525071"/>
+            <a:ext cx="4600618" cy="369332"/>
+          </a:xfrm>
+          <a:prstGeom prst="rect">
+            <a:avLst/>
+          </a:prstGeom>
+          <a:noFill/>
+        </p:spPr>
+        <p:txBody>
+          <a:bodyPr wrap="none" rtlCol="0">
+            <a:spAutoFit/>
+          </a:bodyPr>
+          <a:lstStyle/>
+          <a:p>
+            <a:pPr algn="l"/>
+            <a:r>
+              <a:rPr lang="en-US" sz="1800" b="0" i="0" u="none" strike="noStrike" dirty="0">
+                <a:solidFill>
+                  <a:srgbClr val="000000"/>
+                </a:solidFill>
+                <a:effectLst/>
+                <a:latin typeface="Calibri" panose="020F0502020204030204" pitchFamily="34" charset="0"/>
+              </a:rPr>
+              <a:t>3. Ask the LLM to add comments to your code.</a:t>
+            </a:r>
           </a:p>
         </p:txBody>
       </p:sp>
@@ -3786,7 +3891,7 @@
         </p:blipFill>
         <p:spPr>
           <a:xfrm>
-            <a:off x="3509962" y="1400175"/>
+            <a:off x="3509962" y="1862896"/>
             <a:ext cx="5172075" cy="381000"/>
           </a:xfrm>
           <a:prstGeom prst="rect">
@@ -3808,7 +3913,7 @@
         </p:nvSpPr>
         <p:spPr>
           <a:xfrm>
-            <a:off x="5280262" y="555694"/>
+            <a:off x="5280262" y="1018415"/>
             <a:ext cx="1631472" cy="707886"/>
           </a:xfrm>
           <a:prstGeom prst="rect">
@@ -3863,6 +3968,48 @@
               <a:t>After</a:t>
             </a:r>
             <a:endParaRPr lang="lt-LT" sz="4000" dirty="0"/>
+          </a:p>
+        </p:txBody>
+      </p:sp>
+      <p:sp>
+        <p:nvSpPr>
+          <p:cNvPr id="2" name="TextBox 1">
+            <a:extLst>
+              <a:ext uri="{FF2B5EF4-FFF2-40B4-BE49-F238E27FC236}">
+                <a16:creationId xmlns:a16="http://schemas.microsoft.com/office/drawing/2014/main" id="{9D1ADA4E-E663-A3DC-4877-C0B6B3511BA6}"/>
+              </a:ext>
+            </a:extLst>
+          </p:cNvPr>
+          <p:cNvSpPr txBox="1"/>
+          <p:nvPr/>
+        </p:nvSpPr>
+        <p:spPr>
+          <a:xfrm>
+            <a:off x="1120500" y="492300"/>
+            <a:ext cx="9950994" cy="369332"/>
+          </a:xfrm>
+          <a:prstGeom prst="rect">
+            <a:avLst/>
+          </a:prstGeom>
+          <a:noFill/>
+        </p:spPr>
+        <p:txBody>
+          <a:bodyPr wrap="none" rtlCol="0">
+            <a:spAutoFit/>
+          </a:bodyPr>
+          <a:lstStyle/>
+          <a:p>
+            <a:pPr algn="l"/>
+            <a:r>
+              <a:rPr lang="en-US" sz="1800" b="0" i="0" u="none" strike="noStrike" dirty="0">
+                <a:solidFill>
+                  <a:srgbClr val="000000"/>
+                </a:solidFill>
+                <a:effectLst/>
+                <a:latin typeface="Calibri" panose="020F0502020204030204" pitchFamily="34" charset="0"/>
+              </a:rPr>
+              <a:t>4. Ask the LLM to check if your code complies with the PEP8 coding style and highlight where it does not.</a:t>
+            </a:r>
           </a:p>
         </p:txBody>
       </p:sp>
@@ -3918,7 +4065,7 @@
         </p:blipFill>
         <p:spPr>
           <a:xfrm>
-            <a:off x="700087" y="3586162"/>
+            <a:off x="700084" y="3948113"/>
             <a:ext cx="10791825" cy="2524125"/>
           </a:xfrm>
           <a:prstGeom prst="rect">
@@ -3948,7 +4095,7 @@
         </p:blipFill>
         <p:spPr>
           <a:xfrm>
-            <a:off x="371474" y="1604962"/>
+            <a:off x="371470" y="2462212"/>
             <a:ext cx="11449050" cy="447675"/>
           </a:xfrm>
           <a:prstGeom prst="rect">
@@ -3970,7 +4117,7 @@
         </p:nvSpPr>
         <p:spPr>
           <a:xfrm>
-            <a:off x="5280262" y="555694"/>
+            <a:off x="5280255" y="1754326"/>
             <a:ext cx="1631472" cy="707886"/>
           </a:xfrm>
           <a:prstGeom prst="rect">
@@ -4006,7 +4153,7 @@
         </p:nvSpPr>
         <p:spPr>
           <a:xfrm>
-            <a:off x="5471211" y="2646432"/>
+            <a:off x="5471209" y="3159056"/>
             <a:ext cx="1249573" cy="707886"/>
           </a:xfrm>
           <a:prstGeom prst="rect">
@@ -4025,6 +4172,48 @@
               <a:t>After</a:t>
             </a:r>
             <a:endParaRPr lang="lt-LT" sz="4000" dirty="0"/>
+          </a:p>
+        </p:txBody>
+      </p:sp>
+      <p:sp>
+        <p:nvSpPr>
+          <p:cNvPr id="2" name="TextBox 1">
+            <a:extLst>
+              <a:ext uri="{FF2B5EF4-FFF2-40B4-BE49-F238E27FC236}">
+                <a16:creationId xmlns:a16="http://schemas.microsoft.com/office/drawing/2014/main" id="{9F8F7511-7C9B-EE48-652D-53C4AD688B9A}"/>
+              </a:ext>
+            </a:extLst>
+          </p:cNvPr>
+          <p:cNvSpPr txBox="1"/>
+          <p:nvPr/>
+        </p:nvSpPr>
+        <p:spPr>
+          <a:xfrm>
+            <a:off x="3283265" y="531434"/>
+            <a:ext cx="5625451" cy="369332"/>
+          </a:xfrm>
+          <a:prstGeom prst="rect">
+            <a:avLst/>
+          </a:prstGeom>
+          <a:noFill/>
+        </p:spPr>
+        <p:txBody>
+          <a:bodyPr wrap="none" rtlCol="0">
+            <a:spAutoFit/>
+          </a:bodyPr>
+          <a:lstStyle/>
+          <a:p>
+            <a:pPr algn="l"/>
+            <a:r>
+              <a:rPr lang="en-US" sz="1800" b="0" i="0" u="none" strike="noStrike" dirty="0">
+                <a:solidFill>
+                  <a:srgbClr val="000000"/>
+                </a:solidFill>
+                <a:effectLst/>
+                <a:latin typeface="Calibri" panose="020F0502020204030204" pitchFamily="34" charset="0"/>
+              </a:rPr>
+              <a:t>5. Ask the LLM to apply clean code principles to your code.</a:t>
+            </a:r>
           </a:p>
         </p:txBody>
       </p:sp>
@@ -4072,7 +4261,7 @@
         </p:nvSpPr>
         <p:spPr>
           <a:xfrm>
-            <a:off x="5280262" y="555694"/>
+            <a:off x="5280256" y="1538229"/>
             <a:ext cx="1631472" cy="707886"/>
           </a:xfrm>
           <a:prstGeom prst="rect">
@@ -4108,7 +4297,7 @@
         </p:nvSpPr>
         <p:spPr>
           <a:xfrm>
-            <a:off x="5471207" y="2932182"/>
+            <a:off x="5471206" y="3362473"/>
             <a:ext cx="1249573" cy="707886"/>
           </a:xfrm>
           <a:prstGeom prst="rect">
@@ -4132,10 +4321,10 @@
       </p:sp>
       <p:pic>
         <p:nvPicPr>
-          <p:cNvPr id="9" name="Paveikslėlis 8">
-            <a:extLst>
-              <a:ext uri="{FF2B5EF4-FFF2-40B4-BE49-F238E27FC236}">
-                <a16:creationId xmlns:a16="http://schemas.microsoft.com/office/drawing/2014/main" id="{6E06580D-0415-635E-3F55-3FB84EFDED78}"/>
+          <p:cNvPr id="3" name="Paveikslėlis 2">
+            <a:extLst>
+              <a:ext uri="{FF2B5EF4-FFF2-40B4-BE49-F238E27FC236}">
+                <a16:creationId xmlns:a16="http://schemas.microsoft.com/office/drawing/2014/main" id="{E542C0B2-10BC-08CB-A2F9-D43D71D21783}"/>
               </a:ext>
             </a:extLst>
           </p:cNvPr>
@@ -4152,8 +4341,8 @@
         </p:blipFill>
         <p:spPr>
           <a:xfrm>
-            <a:off x="3530970" y="1459050"/>
-            <a:ext cx="5130053" cy="1038225"/>
+            <a:off x="2202586" y="4070359"/>
+            <a:ext cx="7786828" cy="2213902"/>
           </a:xfrm>
           <a:prstGeom prst="rect">
             <a:avLst/>
@@ -4162,10 +4351,10 @@
       </p:pic>
       <p:pic>
         <p:nvPicPr>
-          <p:cNvPr id="11" name="Paveikslėlis 10">
-            <a:extLst>
-              <a:ext uri="{FF2B5EF4-FFF2-40B4-BE49-F238E27FC236}">
-                <a16:creationId xmlns:a16="http://schemas.microsoft.com/office/drawing/2014/main" id="{5A00816A-6536-7A9B-44A7-ABFCC6624ABD}"/>
+          <p:cNvPr id="5" name="Paveikslėlis 4">
+            <a:extLst>
+              <a:ext uri="{FF2B5EF4-FFF2-40B4-BE49-F238E27FC236}">
+                <a16:creationId xmlns:a16="http://schemas.microsoft.com/office/drawing/2014/main" id="{0D8027F1-A640-A1B7-A18E-814738ACE831}"/>
               </a:ext>
             </a:extLst>
           </p:cNvPr>
@@ -4182,14 +4371,60 @@
         </p:blipFill>
         <p:spPr>
           <a:xfrm>
-            <a:off x="2826769" y="3779700"/>
-            <a:ext cx="6538453" cy="1816237"/>
+            <a:off x="3701366" y="2282691"/>
+            <a:ext cx="4789252" cy="753993"/>
           </a:xfrm>
           <a:prstGeom prst="rect">
             <a:avLst/>
           </a:prstGeom>
         </p:spPr>
       </p:pic>
+      <p:sp>
+        <p:nvSpPr>
+          <p:cNvPr id="8" name="TextBox 7">
+            <a:extLst>
+              <a:ext uri="{FF2B5EF4-FFF2-40B4-BE49-F238E27FC236}">
+                <a16:creationId xmlns:a16="http://schemas.microsoft.com/office/drawing/2014/main" id="{798B039A-3824-8418-89F7-A319CE3681C6}"/>
+              </a:ext>
+            </a:extLst>
+          </p:cNvPr>
+          <p:cNvSpPr txBox="1"/>
+          <p:nvPr/>
+        </p:nvSpPr>
+        <p:spPr>
+          <a:xfrm>
+            <a:off x="1136557" y="562245"/>
+            <a:ext cx="9918869" cy="369332"/>
+          </a:xfrm>
+          <a:prstGeom prst="rect">
+            <a:avLst/>
+          </a:prstGeom>
+          <a:noFill/>
+        </p:spPr>
+        <p:txBody>
+          <a:bodyPr wrap="none" rtlCol="0">
+            <a:spAutoFit/>
+          </a:bodyPr>
+          <a:lstStyle/>
+          <a:p>
+            <a:pPr algn="l">
+              <a:spcAft>
+                <a:spcPts val="800"/>
+              </a:spcAft>
+            </a:pPr>
+            <a:r>
+              <a:rPr lang="en-US" sz="1800" b="0" i="0" u="none" strike="noStrike" dirty="0">
+                <a:solidFill>
+                  <a:srgbClr val="000000"/>
+                </a:solidFill>
+                <a:effectLst/>
+                <a:latin typeface="Calibri" panose="020F0502020204030204" pitchFamily="34" charset="0"/>
+              </a:rPr>
+              <a:t>6. Ask the LLM to optimize your code and provide suggestions on how to make it more efficient or faster.</a:t>
+            </a:r>
+          </a:p>
+        </p:txBody>
+      </p:sp>
     </p:spTree>
     <p:extLst>
       <p:ext uri="{BB962C8B-B14F-4D97-AF65-F5344CB8AC3E}">

</xml_diff>